<commit_message>
create the "commonly used circuits" folder
</commit_message>
<xml_diff>
--- a/ECSE/Workshop-2/workshop2.pptx
+++ b/ECSE/Workshop-2/workshop2.pptx
@@ -8,6 +8,7 @@
     <p:sldId id="256" r:id="rId2"/>
     <p:sldId id="257" r:id="rId3"/>
     <p:sldId id="258" r:id="rId4"/>
+    <p:sldId id="259" r:id="rId5"/>
   </p:sldIdLst>
   <p:sldSz cx="12192000" cy="6858000"/>
   <p:notesSz cx="6858000" cy="9144000"/>
@@ -3648,6 +3649,93 @@
 </p:sld>
 </file>
 
+<file path=ppt/slides/slide4.xml><?xml version="1.0" encoding="utf-8"?>
+<p:sld xmlns:a="http://schemas.openxmlformats.org/drawingml/2006/main" xmlns:r="http://schemas.openxmlformats.org/officeDocument/2006/relationships" xmlns:p="http://schemas.openxmlformats.org/presentationml/2006/main">
+  <p:cSld>
+    <p:spTree>
+      <p:nvGrpSpPr>
+        <p:cNvPr id="1" name=""/>
+        <p:cNvGrpSpPr/>
+        <p:nvPr/>
+      </p:nvGrpSpPr>
+      <p:grpSpPr>
+        <a:xfrm>
+          <a:off x="0" y="0"/>
+          <a:ext cx="0" cy="0"/>
+          <a:chOff x="0" y="0"/>
+          <a:chExt cx="0" cy="0"/>
+        </a:xfrm>
+      </p:grpSpPr>
+      <p:sp>
+        <p:nvSpPr>
+          <p:cNvPr id="2" name="Title 1">
+            <a:extLst>
+              <a:ext uri="{FF2B5EF4-FFF2-40B4-BE49-F238E27FC236}">
+                <a16:creationId xmlns:a16="http://schemas.microsoft.com/office/drawing/2014/main" id="{0713A968-0C89-4C0F-9F5A-0445B7EE5DCA}"/>
+              </a:ext>
+            </a:extLst>
+          </p:cNvPr>
+          <p:cNvSpPr>
+            <a:spLocks noGrp="1"/>
+          </p:cNvSpPr>
+          <p:nvPr>
+            <p:ph type="title"/>
+          </p:nvPr>
+        </p:nvSpPr>
+        <p:spPr/>
+        <p:txBody>
+          <a:bodyPr/>
+          <a:lstStyle/>
+          <a:p>
+            <a:endParaRPr lang="en-CA" dirty="0"/>
+          </a:p>
+        </p:txBody>
+      </p:sp>
+      <p:pic>
+        <p:nvPicPr>
+          <p:cNvPr id="4" name="Content Placeholder 3">
+            <a:extLst>
+              <a:ext uri="{FF2B5EF4-FFF2-40B4-BE49-F238E27FC236}">
+                <a16:creationId xmlns:a16="http://schemas.microsoft.com/office/drawing/2014/main" id="{6C09291A-36CF-4861-9773-667B72292373}"/>
+              </a:ext>
+            </a:extLst>
+          </p:cNvPr>
+          <p:cNvPicPr>
+            <a:picLocks noGrp="1" noChangeAspect="1"/>
+          </p:cNvPicPr>
+          <p:nvPr>
+            <p:ph idx="1"/>
+          </p:nvPr>
+        </p:nvPicPr>
+        <p:blipFill>
+          <a:blip r:embed="rId2"/>
+          <a:stretch>
+            <a:fillRect/>
+          </a:stretch>
+        </p:blipFill>
+        <p:spPr>
+          <a:xfrm>
+            <a:off x="217790" y="755515"/>
+            <a:ext cx="11756420" cy="5346969"/>
+          </a:xfrm>
+          <a:prstGeom prst="rect">
+            <a:avLst/>
+          </a:prstGeom>
+        </p:spPr>
+      </p:pic>
+    </p:spTree>
+    <p:extLst>
+      <p:ext uri="{BB962C8B-B14F-4D97-AF65-F5344CB8AC3E}">
+        <p14:creationId xmlns:p14="http://schemas.microsoft.com/office/powerpoint/2010/main" val="2222709221"/>
+      </p:ext>
+    </p:extLst>
+  </p:cSld>
+  <p:clrMapOvr>
+    <a:masterClrMapping/>
+  </p:clrMapOvr>
+</p:sld>
+</file>
+
 <file path=ppt/theme/theme1.xml><?xml version="1.0" encoding="utf-8"?>
 <a:theme xmlns:a="http://schemas.openxmlformats.org/drawingml/2006/main" name="Office Theme">
   <a:themeElements>

</xml_diff>

<commit_message>
changing order of workshops 3 and 4. adding details to ws2 example code
</commit_message>
<xml_diff>
--- a/ECSE/Workshop-2/workshop2.pptx
+++ b/ECSE/Workshop-2/workshop2.pptx
@@ -5,7 +5,7 @@
     <p:sldMasterId id="2147483648" r:id="rId1"/>
   </p:sldMasterIdLst>
   <p:notesMasterIdLst>
-    <p:notesMasterId r:id="rId11"/>
+    <p:notesMasterId r:id="rId16"/>
   </p:notesMasterIdLst>
   <p:sldIdLst>
     <p:sldId id="256" r:id="rId2"/>
@@ -17,6 +17,11 @@
     <p:sldId id="266" r:id="rId8"/>
     <p:sldId id="267" r:id="rId9"/>
     <p:sldId id="268" r:id="rId10"/>
+    <p:sldId id="269" r:id="rId11"/>
+    <p:sldId id="270" r:id="rId12"/>
+    <p:sldId id="271" r:id="rId13"/>
+    <p:sldId id="272" r:id="rId14"/>
+    <p:sldId id="273" r:id="rId15"/>
   </p:sldIdLst>
   <p:sldSz cx="12192000" cy="6858000"/>
   <p:notesSz cx="6858000" cy="9144000"/>
@@ -3884,6 +3889,388 @@
 </p:sld>
 </file>
 
+<file path=ppt/slides/slide10.xml><?xml version="1.0" encoding="utf-8"?>
+<p:sld xmlns:a="http://schemas.openxmlformats.org/drawingml/2006/main" xmlns:r="http://schemas.openxmlformats.org/officeDocument/2006/relationships" xmlns:p="http://schemas.openxmlformats.org/presentationml/2006/main">
+  <p:cSld>
+    <p:spTree>
+      <p:nvGrpSpPr>
+        <p:cNvPr id="1" name=""/>
+        <p:cNvGrpSpPr/>
+        <p:nvPr/>
+      </p:nvGrpSpPr>
+      <p:grpSpPr>
+        <a:xfrm>
+          <a:off x="0" y="0"/>
+          <a:ext cx="0" cy="0"/>
+          <a:chOff x="0" y="0"/>
+          <a:chExt cx="0" cy="0"/>
+        </a:xfrm>
+      </p:grpSpPr>
+      <p:sp>
+        <p:nvSpPr>
+          <p:cNvPr id="2" name="Title 1">
+            <a:extLst>
+              <a:ext uri="{FF2B5EF4-FFF2-40B4-BE49-F238E27FC236}">
+                <a16:creationId xmlns:a16="http://schemas.microsoft.com/office/drawing/2014/main" id="{CA9E99D0-377B-45FE-9921-BBD79C79467D}"/>
+              </a:ext>
+            </a:extLst>
+          </p:cNvPr>
+          <p:cNvSpPr>
+            <a:spLocks noGrp="1"/>
+          </p:cNvSpPr>
+          <p:nvPr>
+            <p:ph type="title"/>
+          </p:nvPr>
+        </p:nvSpPr>
+        <p:spPr/>
+        <p:txBody>
+          <a:bodyPr/>
+          <a:lstStyle/>
+          <a:p>
+            <a:r>
+              <a:rPr lang="en-CA" dirty="0"/>
+              <a:t>Compiling code for the Arduino Nano</a:t>
+            </a:r>
+          </a:p>
+        </p:txBody>
+      </p:sp>
+      <p:sp>
+        <p:nvSpPr>
+          <p:cNvPr id="6" name="Content Placeholder 5">
+            <a:extLst>
+              <a:ext uri="{FF2B5EF4-FFF2-40B4-BE49-F238E27FC236}">
+                <a16:creationId xmlns:a16="http://schemas.microsoft.com/office/drawing/2014/main" id="{972C5A12-6D26-483A-9577-5EC9DF0E0B45}"/>
+              </a:ext>
+            </a:extLst>
+          </p:cNvPr>
+          <p:cNvSpPr>
+            <a:spLocks noGrp="1"/>
+          </p:cNvSpPr>
+          <p:nvPr>
+            <p:ph idx="1"/>
+          </p:nvPr>
+        </p:nvSpPr>
+        <p:spPr/>
+        <p:txBody>
+          <a:bodyPr>
+            <a:normAutofit lnSpcReduction="10000"/>
+          </a:bodyPr>
+          <a:lstStyle/>
+          <a:p>
+            <a:r>
+              <a:rPr lang="en-US" dirty="0"/>
+              <a:t>Go to Tools &gt; Board</a:t>
+            </a:r>
+          </a:p>
+          <a:p>
+            <a:pPr lvl="1"/>
+            <a:r>
+              <a:rPr lang="en-US" dirty="0"/>
+              <a:t>Select Arduino Nano</a:t>
+            </a:r>
+          </a:p>
+          <a:p>
+            <a:pPr lvl="1"/>
+            <a:endParaRPr lang="en-US" dirty="0"/>
+          </a:p>
+          <a:p>
+            <a:r>
+              <a:rPr lang="en-US" dirty="0"/>
+              <a:t>Go to Tools &gt; Processor</a:t>
+            </a:r>
+          </a:p>
+          <a:p>
+            <a:pPr lvl="1"/>
+            <a:r>
+              <a:rPr lang="en-US" dirty="0"/>
+              <a:t>Select Atmega328P (Old Bootloader)</a:t>
+            </a:r>
+          </a:p>
+          <a:p>
+            <a:endParaRPr lang="en-US" dirty="0"/>
+          </a:p>
+          <a:p>
+            <a:r>
+              <a:rPr lang="en-US" dirty="0"/>
+              <a:t>Go to Tools &gt; Port</a:t>
+            </a:r>
+          </a:p>
+          <a:p>
+            <a:pPr lvl="1"/>
+            <a:r>
+              <a:rPr lang="en-US" dirty="0"/>
+              <a:t>Select the port on which your Arduino is connected</a:t>
+            </a:r>
+          </a:p>
+          <a:p>
+            <a:pPr lvl="1"/>
+            <a:endParaRPr lang="en-US" dirty="0"/>
+          </a:p>
+          <a:p>
+            <a:r>
+              <a:rPr lang="en-US" dirty="0"/>
+              <a:t>Compile the sketch and it will upload to your Arduino</a:t>
+            </a:r>
+          </a:p>
+          <a:p>
+            <a:pPr lvl="1"/>
+            <a:endParaRPr lang="en-CA" dirty="0"/>
+          </a:p>
+        </p:txBody>
+      </p:sp>
+    </p:spTree>
+    <p:extLst>
+      <p:ext uri="{BB962C8B-B14F-4D97-AF65-F5344CB8AC3E}">
+        <p14:creationId xmlns:p14="http://schemas.microsoft.com/office/powerpoint/2010/main" val="1656028821"/>
+      </p:ext>
+    </p:extLst>
+  </p:cSld>
+  <p:clrMapOvr>
+    <a:masterClrMapping/>
+  </p:clrMapOvr>
+</p:sld>
+</file>
+
+<file path=ppt/slides/slide11.xml><?xml version="1.0" encoding="utf-8"?>
+<p:sld xmlns:a="http://schemas.openxmlformats.org/drawingml/2006/main" xmlns:r="http://schemas.openxmlformats.org/officeDocument/2006/relationships" xmlns:p="http://schemas.openxmlformats.org/presentationml/2006/main">
+  <p:cSld>
+    <p:spTree>
+      <p:nvGrpSpPr>
+        <p:cNvPr id="1" name=""/>
+        <p:cNvGrpSpPr/>
+        <p:nvPr/>
+      </p:nvGrpSpPr>
+      <p:grpSpPr>
+        <a:xfrm>
+          <a:off x="0" y="0"/>
+          <a:ext cx="0" cy="0"/>
+          <a:chOff x="0" y="0"/>
+          <a:chExt cx="0" cy="0"/>
+        </a:xfrm>
+      </p:grpSpPr>
+      <p:pic>
+        <p:nvPicPr>
+          <p:cNvPr id="4" name="Picture 3">
+            <a:extLst>
+              <a:ext uri="{FF2B5EF4-FFF2-40B4-BE49-F238E27FC236}">
+                <a16:creationId xmlns:a16="http://schemas.microsoft.com/office/drawing/2014/main" id="{3FB61CA1-9E09-406E-A637-4D99184B97D4}"/>
+              </a:ext>
+            </a:extLst>
+          </p:cNvPr>
+          <p:cNvPicPr>
+            <a:picLocks noChangeAspect="1"/>
+          </p:cNvPicPr>
+          <p:nvPr/>
+        </p:nvPicPr>
+        <p:blipFill>
+          <a:blip r:embed="rId2"/>
+          <a:stretch>
+            <a:fillRect/>
+          </a:stretch>
+        </p:blipFill>
+        <p:spPr>
+          <a:xfrm>
+            <a:off x="0" y="1673"/>
+            <a:ext cx="12192000" cy="6854653"/>
+          </a:xfrm>
+          <a:prstGeom prst="rect">
+            <a:avLst/>
+          </a:prstGeom>
+        </p:spPr>
+      </p:pic>
+    </p:spTree>
+    <p:extLst>
+      <p:ext uri="{BB962C8B-B14F-4D97-AF65-F5344CB8AC3E}">
+        <p14:creationId xmlns:p14="http://schemas.microsoft.com/office/powerpoint/2010/main" val="2545183306"/>
+      </p:ext>
+    </p:extLst>
+  </p:cSld>
+  <p:clrMapOvr>
+    <a:masterClrMapping/>
+  </p:clrMapOvr>
+</p:sld>
+</file>
+
+<file path=ppt/slides/slide12.xml><?xml version="1.0" encoding="utf-8"?>
+<p:sld xmlns:a="http://schemas.openxmlformats.org/drawingml/2006/main" xmlns:r="http://schemas.openxmlformats.org/officeDocument/2006/relationships" xmlns:p="http://schemas.openxmlformats.org/presentationml/2006/main">
+  <p:cSld>
+    <p:spTree>
+      <p:nvGrpSpPr>
+        <p:cNvPr id="1" name=""/>
+        <p:cNvGrpSpPr/>
+        <p:nvPr/>
+      </p:nvGrpSpPr>
+      <p:grpSpPr>
+        <a:xfrm>
+          <a:off x="0" y="0"/>
+          <a:ext cx="0" cy="0"/>
+          <a:chOff x="0" y="0"/>
+          <a:chExt cx="0" cy="0"/>
+        </a:xfrm>
+      </p:grpSpPr>
+      <p:pic>
+        <p:nvPicPr>
+          <p:cNvPr id="2" name="Picture 1">
+            <a:extLst>
+              <a:ext uri="{FF2B5EF4-FFF2-40B4-BE49-F238E27FC236}">
+                <a16:creationId xmlns:a16="http://schemas.microsoft.com/office/drawing/2014/main" id="{54271A54-DCEF-4159-901C-FC3B40C95FC7}"/>
+              </a:ext>
+            </a:extLst>
+          </p:cNvPr>
+          <p:cNvPicPr>
+            <a:picLocks noChangeAspect="1"/>
+          </p:cNvPicPr>
+          <p:nvPr/>
+        </p:nvPicPr>
+        <p:blipFill>
+          <a:blip r:embed="rId2"/>
+          <a:stretch>
+            <a:fillRect/>
+          </a:stretch>
+        </p:blipFill>
+        <p:spPr>
+          <a:xfrm>
+            <a:off x="0" y="1673"/>
+            <a:ext cx="12192000" cy="6854653"/>
+          </a:xfrm>
+          <a:prstGeom prst="rect">
+            <a:avLst/>
+          </a:prstGeom>
+        </p:spPr>
+      </p:pic>
+    </p:spTree>
+    <p:extLst>
+      <p:ext uri="{BB962C8B-B14F-4D97-AF65-F5344CB8AC3E}">
+        <p14:creationId xmlns:p14="http://schemas.microsoft.com/office/powerpoint/2010/main" val="3260015308"/>
+      </p:ext>
+    </p:extLst>
+  </p:cSld>
+  <p:clrMapOvr>
+    <a:masterClrMapping/>
+  </p:clrMapOvr>
+</p:sld>
+</file>
+
+<file path=ppt/slides/slide13.xml><?xml version="1.0" encoding="utf-8"?>
+<p:sld xmlns:a="http://schemas.openxmlformats.org/drawingml/2006/main" xmlns:r="http://schemas.openxmlformats.org/officeDocument/2006/relationships" xmlns:p="http://schemas.openxmlformats.org/presentationml/2006/main">
+  <p:cSld>
+    <p:spTree>
+      <p:nvGrpSpPr>
+        <p:cNvPr id="1" name=""/>
+        <p:cNvGrpSpPr/>
+        <p:nvPr/>
+      </p:nvGrpSpPr>
+      <p:grpSpPr>
+        <a:xfrm>
+          <a:off x="0" y="0"/>
+          <a:ext cx="0" cy="0"/>
+          <a:chOff x="0" y="0"/>
+          <a:chExt cx="0" cy="0"/>
+        </a:xfrm>
+      </p:grpSpPr>
+      <p:pic>
+        <p:nvPicPr>
+          <p:cNvPr id="2" name="Picture 1">
+            <a:extLst>
+              <a:ext uri="{FF2B5EF4-FFF2-40B4-BE49-F238E27FC236}">
+                <a16:creationId xmlns:a16="http://schemas.microsoft.com/office/drawing/2014/main" id="{F3AF9CC3-2165-4FE0-AFFF-6E4CA41183E8}"/>
+              </a:ext>
+            </a:extLst>
+          </p:cNvPr>
+          <p:cNvPicPr>
+            <a:picLocks noChangeAspect="1"/>
+          </p:cNvPicPr>
+          <p:nvPr/>
+        </p:nvPicPr>
+        <p:blipFill>
+          <a:blip r:embed="rId2"/>
+          <a:stretch>
+            <a:fillRect/>
+          </a:stretch>
+        </p:blipFill>
+        <p:spPr>
+          <a:xfrm>
+            <a:off x="0" y="1673"/>
+            <a:ext cx="12192000" cy="6854653"/>
+          </a:xfrm>
+          <a:prstGeom prst="rect">
+            <a:avLst/>
+          </a:prstGeom>
+        </p:spPr>
+      </p:pic>
+    </p:spTree>
+    <p:extLst>
+      <p:ext uri="{BB962C8B-B14F-4D97-AF65-F5344CB8AC3E}">
+        <p14:creationId xmlns:p14="http://schemas.microsoft.com/office/powerpoint/2010/main" val="659549312"/>
+      </p:ext>
+    </p:extLst>
+  </p:cSld>
+  <p:clrMapOvr>
+    <a:masterClrMapping/>
+  </p:clrMapOvr>
+</p:sld>
+</file>
+
+<file path=ppt/slides/slide14.xml><?xml version="1.0" encoding="utf-8"?>
+<p:sld xmlns:a="http://schemas.openxmlformats.org/drawingml/2006/main" xmlns:r="http://schemas.openxmlformats.org/officeDocument/2006/relationships" xmlns:p="http://schemas.openxmlformats.org/presentationml/2006/main">
+  <p:cSld>
+    <p:spTree>
+      <p:nvGrpSpPr>
+        <p:cNvPr id="1" name=""/>
+        <p:cNvGrpSpPr/>
+        <p:nvPr/>
+      </p:nvGrpSpPr>
+      <p:grpSpPr>
+        <a:xfrm>
+          <a:off x="0" y="0"/>
+          <a:ext cx="0" cy="0"/>
+          <a:chOff x="0" y="0"/>
+          <a:chExt cx="0" cy="0"/>
+        </a:xfrm>
+      </p:grpSpPr>
+      <p:pic>
+        <p:nvPicPr>
+          <p:cNvPr id="3" name="Picture 2">
+            <a:extLst>
+              <a:ext uri="{FF2B5EF4-FFF2-40B4-BE49-F238E27FC236}">
+                <a16:creationId xmlns:a16="http://schemas.microsoft.com/office/drawing/2014/main" id="{A53B0551-8D51-429D-956C-DAAE55EBCBAD}"/>
+              </a:ext>
+            </a:extLst>
+          </p:cNvPr>
+          <p:cNvPicPr>
+            <a:picLocks noChangeAspect="1"/>
+          </p:cNvPicPr>
+          <p:nvPr/>
+        </p:nvPicPr>
+        <p:blipFill>
+          <a:blip r:embed="rId2"/>
+          <a:stretch>
+            <a:fillRect/>
+          </a:stretch>
+        </p:blipFill>
+        <p:spPr>
+          <a:xfrm>
+            <a:off x="0" y="1673"/>
+            <a:ext cx="12192000" cy="6854653"/>
+          </a:xfrm>
+          <a:prstGeom prst="rect">
+            <a:avLst/>
+          </a:prstGeom>
+        </p:spPr>
+      </p:pic>
+    </p:spTree>
+    <p:extLst>
+      <p:ext uri="{BB962C8B-B14F-4D97-AF65-F5344CB8AC3E}">
+        <p14:creationId xmlns:p14="http://schemas.microsoft.com/office/powerpoint/2010/main" val="3277692844"/>
+      </p:ext>
+    </p:extLst>
+  </p:cSld>
+  <p:clrMapOvr>
+    <a:masterClrMapping/>
+  </p:clrMapOvr>
+</p:sld>
+</file>
+
 <file path=ppt/slides/slide2.xml><?xml version="1.0" encoding="utf-8"?>
 <p:sld xmlns:a="http://schemas.openxmlformats.org/drawingml/2006/main" xmlns:r="http://schemas.openxmlformats.org/officeDocument/2006/relationships" xmlns:p="http://schemas.openxmlformats.org/presentationml/2006/main">
   <p:cSld>
@@ -4261,35 +4648,21 @@
           <a:p>
             <a:r>
               <a:rPr lang="en-CA" dirty="0"/>
-              <a:t>Teach what an Arduino is </a:t>
+              <a:t>background information</a:t>
             </a:r>
           </a:p>
           <a:p>
             <a:pPr lvl="1"/>
             <a:r>
               <a:rPr lang="en-CA" dirty="0"/>
-              <a:t>background information</a:t>
-            </a:r>
-          </a:p>
-          <a:p>
-            <a:pPr lvl="2"/>
+              <a:t>what is it?</a:t>
+            </a:r>
+          </a:p>
+          <a:p>
+            <a:pPr lvl="1"/>
             <a:r>
               <a:rPr lang="en-CA" dirty="0"/>
-              <a:t>how does it work</a:t>
-            </a:r>
-          </a:p>
-          <a:p>
-            <a:pPr lvl="2"/>
-            <a:r>
-              <a:rPr lang="en-CA" dirty="0"/>
-              <a:t>what is it</a:t>
-            </a:r>
-          </a:p>
-          <a:p>
-            <a:pPr lvl="2"/>
-            <a:r>
-              <a:rPr lang="en-CA" dirty="0"/>
-              <a:t>does it taste good</a:t>
+              <a:t>What can you do with it?</a:t>
             </a:r>
           </a:p>
         </p:txBody>
@@ -4704,7 +5077,7 @@
             </a:r>
           </a:p>
           <a:p>
-            <a:pPr lvl="1"/>
+            <a:pPr lvl="2"/>
             <a:r>
               <a:rPr lang="en-CA" dirty="0"/>
               <a:t>value either LOW or HIGH (0 or 1)</a:t>
@@ -4732,7 +5105,7 @@
             </a:r>
             <a:r>
               <a:rPr lang="en-CA" dirty="0"/>
-              <a:t>(pin#) return the state of the pin</a:t>
+              <a:t>(pin#) returns the state of the pin</a:t>
             </a:r>
           </a:p>
           <a:p>
@@ -4876,7 +5249,7 @@
           <a:p>
             <a:r>
               <a:rPr lang="en-CA" dirty="0"/>
-              <a:t>Output pins</a:t>
+              <a:t>Output pins:</a:t>
             </a:r>
           </a:p>
         </p:txBody>

</xml_diff>